<commit_message>
Update KM - Schraubentechnik GmbH & Co.KG Präsentation 3.pptx
</commit_message>
<xml_diff>
--- a/KM - Schraubentechnik GmbH & Co.KG Präsentation 3.pptx
+++ b/KM - Schraubentechnik GmbH & Co.KG Präsentation 3.pptx
@@ -5850,12 +5850,84 @@
           </a:p>
         </p:txBody>
       </p:sp>
+      <p:sp>
+        <p:nvSpPr>
+          <p:cNvPr id="4" name="Textplatzhalter 3">
+            <a:extLst>
+              <a:ext uri="{FF2B5EF4-FFF2-40B4-BE49-F238E27FC236}">
+                <a16:creationId xmlns:a16="http://schemas.microsoft.com/office/drawing/2014/main" id="{694C451C-9F00-4000-9124-886C6688467D}"/>
+              </a:ext>
+            </a:extLst>
+          </p:cNvPr>
+          <p:cNvSpPr>
+            <a:spLocks noGrp="1"/>
+          </p:cNvSpPr>
+          <p:nvPr>
+            <p:ph type="body" sz="half" idx="2"/>
+          </p:nvPr>
+        </p:nvSpPr>
+        <p:spPr/>
+        <p:txBody>
+          <a:bodyPr/>
+          <a:lstStyle/>
+          <a:p>
+            <a:r>
+              <a:rPr lang="de-DE" dirty="0"/>
+              <a:t>- Darstellung mehrerer Parts</a:t>
+            </a:r>
+            <a:br>
+              <a:rPr lang="de-DE" dirty="0"/>
+            </a:br>
+            <a:br>
+              <a:rPr lang="de-DE" dirty="0"/>
+            </a:br>
+            <a:r>
+              <a:rPr lang="de-DE" dirty="0"/>
+              <a:t>- Erzeugung ganzer Produkte</a:t>
+            </a:r>
+            <a:br>
+              <a:rPr lang="de-DE" dirty="0"/>
+            </a:br>
+            <a:br>
+              <a:rPr lang="de-DE" dirty="0"/>
+            </a:br>
+            <a:r>
+              <a:rPr lang="de-DE" dirty="0"/>
+              <a:t>- Schraubensets mit Mutter etc.</a:t>
+            </a:r>
+            <a:br>
+              <a:rPr lang="de-DE" dirty="0"/>
+            </a:br>
+            <a:r>
+              <a:rPr lang="de-DE" dirty="0"/>
+              <a:t>  Können dargestellt werden</a:t>
+            </a:r>
+            <a:br>
+              <a:rPr lang="de-DE" dirty="0"/>
+            </a:br>
+            <a:br>
+              <a:rPr lang="de-DE" dirty="0"/>
+            </a:br>
+            <a:r>
+              <a:rPr lang="de-DE" dirty="0"/>
+              <a:t>- Verschiebbarkeit zur</a:t>
+            </a:r>
+            <a:br>
+              <a:rPr lang="de-DE" dirty="0"/>
+            </a:br>
+            <a:r>
+              <a:rPr lang="de-DE" dirty="0"/>
+              <a:t>  Visualisierung möglich</a:t>
+            </a:r>
+          </a:p>
+        </p:txBody>
+      </p:sp>
       <p:pic>
         <p:nvPicPr>
-          <p:cNvPr id="7" name="Inhaltsplatzhalter 6">
+          <p:cNvPr id="11" name="Inhaltsplatzhalter 10">
             <a:extLst>
               <a:ext uri="{FF2B5EF4-FFF2-40B4-BE49-F238E27FC236}">
-                <a16:creationId xmlns:a16="http://schemas.microsoft.com/office/drawing/2014/main" id="{84A8409F-9327-43CA-B0EA-9353666093FB}"/>
+                <a16:creationId xmlns:a16="http://schemas.microsoft.com/office/drawing/2014/main" id="{89AC4E4B-00A3-4D6C-8A2D-0F01750D15B7}"/>
               </a:ext>
             </a:extLst>
           </p:cNvPr>
@@ -5880,83 +5952,11 @@
         </p:blipFill>
         <p:spPr>
           <a:xfrm>
-            <a:off x="4900613" y="1256554"/>
-            <a:ext cx="6651625" cy="4505230"/>
+            <a:off x="4900613" y="1516054"/>
+            <a:ext cx="6651625" cy="3986229"/>
           </a:xfrm>
         </p:spPr>
       </p:pic>
-      <p:sp>
-        <p:nvSpPr>
-          <p:cNvPr id="4" name="Textplatzhalter 3">
-            <a:extLst>
-              <a:ext uri="{FF2B5EF4-FFF2-40B4-BE49-F238E27FC236}">
-                <a16:creationId xmlns:a16="http://schemas.microsoft.com/office/drawing/2014/main" id="{694C451C-9F00-4000-9124-886C6688467D}"/>
-              </a:ext>
-            </a:extLst>
-          </p:cNvPr>
-          <p:cNvSpPr>
-            <a:spLocks noGrp="1"/>
-          </p:cNvSpPr>
-          <p:nvPr>
-            <p:ph type="body" sz="half" idx="2"/>
-          </p:nvPr>
-        </p:nvSpPr>
-        <p:spPr/>
-        <p:txBody>
-          <a:bodyPr/>
-          <a:lstStyle/>
-          <a:p>
-            <a:r>
-              <a:rPr lang="de-DE" dirty="0"/>
-              <a:t>- Darstellung mehrerer Parts</a:t>
-            </a:r>
-            <a:br>
-              <a:rPr lang="de-DE" dirty="0"/>
-            </a:br>
-            <a:br>
-              <a:rPr lang="de-DE" dirty="0"/>
-            </a:br>
-            <a:r>
-              <a:rPr lang="de-DE" dirty="0"/>
-              <a:t>- Erzeugung ganzer Produkte</a:t>
-            </a:r>
-            <a:br>
-              <a:rPr lang="de-DE" dirty="0"/>
-            </a:br>
-            <a:br>
-              <a:rPr lang="de-DE" dirty="0"/>
-            </a:br>
-            <a:r>
-              <a:rPr lang="de-DE" dirty="0"/>
-              <a:t>- Schraubensets mit Mutter etc.</a:t>
-            </a:r>
-            <a:br>
-              <a:rPr lang="de-DE" dirty="0"/>
-            </a:br>
-            <a:r>
-              <a:rPr lang="de-DE" dirty="0"/>
-              <a:t>  Können dargestellt werden</a:t>
-            </a:r>
-            <a:br>
-              <a:rPr lang="de-DE" dirty="0"/>
-            </a:br>
-            <a:br>
-              <a:rPr lang="de-DE" dirty="0"/>
-            </a:br>
-            <a:r>
-              <a:rPr lang="de-DE" dirty="0"/>
-              <a:t>- Verschiebbarkeit zur</a:t>
-            </a:r>
-            <a:br>
-              <a:rPr lang="de-DE" dirty="0"/>
-            </a:br>
-            <a:r>
-              <a:rPr lang="de-DE" dirty="0"/>
-              <a:t>  Visualisierung möglich</a:t>
-            </a:r>
-          </a:p>
-        </p:txBody>
-      </p:sp>
     </p:spTree>
     <p:extLst>
       <p:ext uri="{BB962C8B-B14F-4D97-AF65-F5344CB8AC3E}">

</xml_diff>